<commit_message>
Commit: add code from today's class - alternative for placeholder, how to customize legend tag, etc.
</commit_message>
<xml_diff>
--- a/exam/paik'sCoffee(2021-10-26)/제출문제양식/UI테스트/문항_01_UI테스트_제출파일_박다예.pptx
+++ b/exam/paik'sCoffee(2021-10-26)/제출문제양식/UI테스트/문항_01_UI테스트_제출파일_박다예.pptx
@@ -6,12 +6,13 @@
     <p:sldMasterId id="2147483650" r:id="rId2"/>
   </p:sldMasterIdLst>
   <p:notesMasterIdLst>
-    <p:notesMasterId r:id="rId6"/>
+    <p:notesMasterId r:id="rId7"/>
   </p:notesMasterIdLst>
   <p:sldIdLst>
     <p:sldId id="256" r:id="rId3"/>
     <p:sldId id="257" r:id="rId4"/>
-    <p:sldId id="258" r:id="rId5"/>
+    <p:sldId id="259" r:id="rId5"/>
+    <p:sldId id="258" r:id="rId6"/>
   </p:sldIdLst>
   <p:sldSz cx="6858000" cy="9906000" type="A4"/>
   <p:notesSz cx="6858000" cy="9144000"/>
@@ -249,7 +250,7 @@
       <p15:sldGuideLst xmlns:p15="http://schemas.microsoft.com/office/powerpoint/2012/main"/>
     </p:ext>
     <p:ext uri="http://customooxmlschemas.google.com/">
-      <go:slidesCustomData xmlns:go="http://customooxmlschemas.google.com/" xmlns:ahyp="http://schemas.microsoft.com/office/drawing/2018/hyperlinkcolor" xmlns:p15="http://schemas.microsoft.com/office/powerpoint/2012/main" xmlns:p14="http://schemas.microsoft.com/office/powerpoint/2010/main" xmlns:com="http://schemas.openxmlformats.org/drawingml/2006/compatibility" xmlns:pvml="urn:schemas-microsoft-com:office:powerpoint" xmlns:v="urn:schemas-microsoft-com:vml" xmlns:o="urn:schemas-microsoft-com:office:office" xmlns:dgm="http://schemas.openxmlformats.org/drawingml/2006/diagram" xmlns:c="http://schemas.openxmlformats.org/drawingml/2006/chart" xmlns:mv="urn:schemas-microsoft-com:mac:vml" xmlns:mc="http://schemas.openxmlformats.org/markup-compatibility/2006" xmlns="" r:id="rId14" roundtripDataSignature="AMtx7mh49FYgup98Kd07mVmJulXK8a+jpw=="/>
+      <go:slidesCustomData xmlns="" xmlns:mc="http://schemas.openxmlformats.org/markup-compatibility/2006" xmlns:mv="urn:schemas-microsoft-com:mac:vml" xmlns:c="http://schemas.openxmlformats.org/drawingml/2006/chart" xmlns:dgm="http://schemas.openxmlformats.org/drawingml/2006/diagram" xmlns:o="urn:schemas-microsoft-com:office:office" xmlns:v="urn:schemas-microsoft-com:vml" xmlns:pvml="urn:schemas-microsoft-com:office:powerpoint" xmlns:com="http://schemas.openxmlformats.org/drawingml/2006/compatibility" xmlns:p14="http://schemas.microsoft.com/office/powerpoint/2010/main" xmlns:p15="http://schemas.microsoft.com/office/powerpoint/2012/main" xmlns:ahyp="http://schemas.microsoft.com/office/drawing/2018/hyperlinkcolor" xmlns:go="http://customooxmlschemas.google.com/" r:id="rId14" roundtripDataSignature="AMtx7mh49FYgup98Kd07mVmJulXK8a+jpw=="/>
     </p:ext>
   </p:extLst>
 </p:presentation>
@@ -1079,6 +1080,133 @@
 </file>
 
 <file path=ppt/notesSlides/notesSlide3.xml><?xml version="1.0" encoding="utf-8"?>
+<p:notes xmlns:a="http://schemas.openxmlformats.org/drawingml/2006/main" xmlns:r="http://schemas.openxmlformats.org/officeDocument/2006/relationships" xmlns:p="http://schemas.openxmlformats.org/presentationml/2006/main" showMasterSp="0" showMasterPhAnim="0">
+  <p:cSld>
+    <p:spTree>
+      <p:nvGrpSpPr>
+        <p:cNvPr id="1" name="Shape 36"/>
+        <p:cNvGrpSpPr/>
+        <p:nvPr/>
+      </p:nvGrpSpPr>
+      <p:grpSpPr>
+        <a:xfrm>
+          <a:off x="0" y="0"/>
+          <a:ext cx="0" cy="0"/>
+          <a:chOff x="0" y="0"/>
+          <a:chExt cx="0" cy="0"/>
+        </a:xfrm>
+      </p:grpSpPr>
+      <p:sp>
+        <p:nvSpPr>
+          <p:cNvPr id="37" name="Google Shape;37;p2:notes"/>
+          <p:cNvSpPr txBox="1">
+            <a:spLocks noGrp="1"/>
+          </p:cNvSpPr>
+          <p:nvPr>
+            <p:ph type="body" idx="1"/>
+          </p:nvPr>
+        </p:nvSpPr>
+        <p:spPr>
+          <a:xfrm>
+            <a:off x="685800" y="4343400"/>
+            <a:ext cx="5486400" cy="4114800"/>
+          </a:xfrm>
+          <a:prstGeom prst="rect">
+            <a:avLst/>
+          </a:prstGeom>
+          <a:noFill/>
+          <a:ln>
+            <a:noFill/>
+          </a:ln>
+        </p:spPr>
+        <p:txBody>
+          <a:bodyPr spcFirstLastPara="1" wrap="square" lIns="91425" tIns="91425" rIns="91425" bIns="91425" anchor="t" anchorCtr="0">
+            <a:noAutofit/>
+          </a:bodyPr>
+          <a:lstStyle/>
+          <a:p>
+            <a:pPr marL="0" lvl="0" indent="0" algn="l" rtl="0">
+              <a:lnSpc>
+                <a:spcPct val="100000"/>
+              </a:lnSpc>
+              <a:spcBef>
+                <a:spcPts val="0"/>
+              </a:spcBef>
+              <a:spcAft>
+                <a:spcPts val="0"/>
+              </a:spcAft>
+              <a:buSzPts val="1100"/>
+              <a:buNone/>
+            </a:pPr>
+            <a:endParaRPr dirty="0"/>
+          </a:p>
+        </p:txBody>
+      </p:sp>
+      <p:sp>
+        <p:nvSpPr>
+          <p:cNvPr id="38" name="Google Shape;38;p2:notes"/>
+          <p:cNvSpPr>
+            <a:spLocks noGrp="1" noRot="1" noChangeAspect="1"/>
+          </p:cNvSpPr>
+          <p:nvPr>
+            <p:ph type="sldImg" idx="2"/>
+          </p:nvPr>
+        </p:nvSpPr>
+        <p:spPr>
+          <a:xfrm>
+            <a:off x="2241550" y="685800"/>
+            <a:ext cx="2374900" cy="3429000"/>
+          </a:xfrm>
+          <a:custGeom>
+            <a:avLst/>
+            <a:gdLst/>
+            <a:ahLst/>
+            <a:cxnLst/>
+            <a:rect l="l" t="t" r="r" b="b"/>
+            <a:pathLst>
+              <a:path w="120000" h="120000" extrusionOk="0">
+                <a:moveTo>
+                  <a:pt x="0" y="0"/>
+                </a:moveTo>
+                <a:lnTo>
+                  <a:pt x="120000" y="0"/>
+                </a:lnTo>
+                <a:lnTo>
+                  <a:pt x="120000" y="120000"/>
+                </a:lnTo>
+                <a:lnTo>
+                  <a:pt x="0" y="120000"/>
+                </a:lnTo>
+                <a:close/>
+              </a:path>
+            </a:pathLst>
+          </a:custGeom>
+          <a:noFill/>
+          <a:ln w="9525" cap="flat" cmpd="sng">
+            <a:solidFill>
+              <a:srgbClr val="000000"/>
+            </a:solidFill>
+            <a:prstDash val="solid"/>
+            <a:round/>
+            <a:headEnd type="none" w="sm" len="sm"/>
+            <a:tailEnd type="none" w="sm" len="sm"/>
+          </a:ln>
+        </p:spPr>
+      </p:sp>
+    </p:spTree>
+    <p:extLst>
+      <p:ext uri="{BB962C8B-B14F-4D97-AF65-F5344CB8AC3E}">
+        <p14:creationId xmlns:p14="http://schemas.microsoft.com/office/powerpoint/2010/main" val="905872801"/>
+      </p:ext>
+    </p:extLst>
+  </p:cSld>
+  <p:clrMapOvr>
+    <a:masterClrMapping/>
+  </p:clrMapOvr>
+</p:notes>
+</file>
+
+<file path=ppt/notesSlides/notesSlide4.xml><?xml version="1.0" encoding="utf-8"?>
 <p:notes xmlns:a="http://schemas.openxmlformats.org/drawingml/2006/main" xmlns:r="http://schemas.openxmlformats.org/officeDocument/2006/relationships" xmlns:p="http://schemas.openxmlformats.org/presentationml/2006/main" showMasterSp="0" showMasterPhAnim="0">
   <p:cSld>
     <p:spTree>
@@ -7273,6 +7401,386 @@
   <p:cSld>
     <p:spTree>
       <p:nvGrpSpPr>
+        <p:cNvPr id="1" name="Shape 39"/>
+        <p:cNvGrpSpPr/>
+        <p:nvPr/>
+      </p:nvGrpSpPr>
+      <p:grpSpPr>
+        <a:xfrm>
+          <a:off x="0" y="0"/>
+          <a:ext cx="0" cy="0"/>
+          <a:chOff x="0" y="0"/>
+          <a:chExt cx="0" cy="0"/>
+        </a:xfrm>
+      </p:grpSpPr>
+      <p:sp>
+        <p:nvSpPr>
+          <p:cNvPr id="40" name="Google Shape;40;p2"/>
+          <p:cNvSpPr txBox="1">
+            <a:spLocks noGrp="1"/>
+          </p:cNvSpPr>
+          <p:nvPr>
+            <p:ph type="ctrTitle"/>
+          </p:nvPr>
+        </p:nvSpPr>
+        <p:spPr>
+          <a:xfrm>
+            <a:off x="275065" y="861776"/>
+            <a:ext cx="6260263" cy="312057"/>
+          </a:xfrm>
+          <a:prstGeom prst="rect">
+            <a:avLst/>
+          </a:prstGeom>
+          <a:noFill/>
+          <a:ln>
+            <a:noFill/>
+          </a:ln>
+        </p:spPr>
+        <p:txBody>
+          <a:bodyPr spcFirstLastPara="1" wrap="square" lIns="91425" tIns="45700" rIns="91425" bIns="45700" anchor="ctr" anchorCtr="0">
+            <a:noAutofit/>
+          </a:bodyPr>
+          <a:lstStyle/>
+          <a:p>
+            <a:pPr marL="0" lvl="0" indent="0" algn="l" rtl="0">
+              <a:lnSpc>
+                <a:spcPct val="90000"/>
+              </a:lnSpc>
+              <a:spcBef>
+                <a:spcPts val="0"/>
+              </a:spcBef>
+              <a:spcAft>
+                <a:spcPts val="0"/>
+              </a:spcAft>
+              <a:buClr>
+                <a:schemeClr val="lt1"/>
+              </a:buClr>
+              <a:buSzPts val="1600"/>
+              <a:buFont typeface="Calibri"/>
+              <a:buNone/>
+            </a:pPr>
+            <a:r>
+              <a:rPr lang="ko-KR" dirty="0">
+                <a:latin typeface="Calibri"/>
+                <a:ea typeface="Calibri"/>
+                <a:cs typeface="Calibri"/>
+                <a:sym typeface="Calibri"/>
+              </a:rPr>
+              <a:t>01.  </a:t>
+            </a:r>
+            <a:r>
+              <a:rPr lang="ko-KR" altLang="en-US" dirty="0" err="1"/>
+              <a:t>프로토페이지</a:t>
+            </a:r>
+            <a:r>
+              <a:rPr lang="ko-KR" altLang="en-US" dirty="0"/>
+              <a:t> 체크 및 결과 비교</a:t>
+            </a:r>
+            <a:endParaRPr dirty="0"/>
+          </a:p>
+        </p:txBody>
+      </p:sp>
+      <p:sp>
+        <p:nvSpPr>
+          <p:cNvPr id="41" name="Google Shape;41;p2"/>
+          <p:cNvSpPr txBox="1">
+            <a:spLocks noGrp="1"/>
+          </p:cNvSpPr>
+          <p:nvPr>
+            <p:ph type="subTitle" idx="1"/>
+          </p:nvPr>
+        </p:nvSpPr>
+        <p:spPr>
+          <a:xfrm>
+            <a:off x="363510" y="1235523"/>
+            <a:ext cx="6191114" cy="242900"/>
+          </a:xfrm>
+          <a:prstGeom prst="rect">
+            <a:avLst/>
+          </a:prstGeom>
+          <a:noFill/>
+          <a:ln>
+            <a:noFill/>
+          </a:ln>
+        </p:spPr>
+        <p:txBody>
+          <a:bodyPr spcFirstLastPara="1" wrap="square" lIns="91425" tIns="45700" rIns="91425" bIns="45700" anchor="ctr" anchorCtr="0">
+            <a:noAutofit/>
+          </a:bodyPr>
+          <a:lstStyle/>
+          <a:p>
+            <a:pPr marL="0" lvl="0" indent="0" algn="l" rtl="0">
+              <a:lnSpc>
+                <a:spcPct val="90000"/>
+              </a:lnSpc>
+              <a:spcBef>
+                <a:spcPts val="0"/>
+              </a:spcBef>
+              <a:spcAft>
+                <a:spcPts val="0"/>
+              </a:spcAft>
+              <a:buClr>
+                <a:srgbClr val="7F7F7F"/>
+              </a:buClr>
+              <a:buSzPts val="1200"/>
+              <a:buNone/>
+            </a:pPr>
+            <a:r>
+              <a:rPr lang="ko-KR" dirty="0"/>
+              <a:t>프로토타입 </a:t>
+            </a:r>
+            <a:r>
+              <a:rPr lang="ko-KR" dirty="0" err="1"/>
+              <a:t>제작</a:t>
+            </a:r>
+            <a:r>
+              <a:rPr lang="ko-KR" altLang="en-US" dirty="0" err="1"/>
+              <a:t>이미지</a:t>
+            </a:r>
+            <a:r>
+              <a:rPr lang="ko-KR" altLang="en-US" dirty="0"/>
+              <a:t> 및 코딩 결과물 비교</a:t>
+            </a:r>
+            <a:endParaRPr dirty="0"/>
+          </a:p>
+        </p:txBody>
+      </p:sp>
+      <p:sp>
+        <p:nvSpPr>
+          <p:cNvPr id="42" name="Google Shape;42;p2"/>
+          <p:cNvSpPr txBox="1">
+            <a:spLocks noGrp="1"/>
+          </p:cNvSpPr>
+          <p:nvPr>
+            <p:ph type="body" idx="2"/>
+          </p:nvPr>
+        </p:nvSpPr>
+        <p:spPr>
+          <a:xfrm>
+            <a:off x="363510" y="1521485"/>
+            <a:ext cx="2859115" cy="312057"/>
+          </a:xfrm>
+          <a:prstGeom prst="rect">
+            <a:avLst/>
+          </a:prstGeom>
+          <a:noFill/>
+          <a:ln>
+            <a:noFill/>
+          </a:ln>
+        </p:spPr>
+        <p:txBody>
+          <a:bodyPr spcFirstLastPara="1" wrap="square" lIns="91425" tIns="45700" rIns="91425" bIns="45700" anchor="t" anchorCtr="0">
+            <a:noAutofit/>
+          </a:bodyPr>
+          <a:lstStyle/>
+          <a:p>
+            <a:pPr marL="171450" lvl="0" indent="-171450" algn="l" rtl="0">
+              <a:lnSpc>
+                <a:spcPct val="100000"/>
+              </a:lnSpc>
+              <a:spcBef>
+                <a:spcPts val="0"/>
+              </a:spcBef>
+              <a:spcAft>
+                <a:spcPts val="0"/>
+              </a:spcAft>
+              <a:buClr>
+                <a:srgbClr val="2AB9C7"/>
+              </a:buClr>
+              <a:buSzPts val="1100"/>
+              <a:buFont typeface="Calibri"/>
+              <a:buChar char="•"/>
+            </a:pPr>
+            <a:r>
+              <a:rPr lang="ko-KR" altLang="en-US" dirty="0"/>
+              <a:t>프로토타입 원본</a:t>
+            </a:r>
+            <a:r>
+              <a:rPr lang="en-US" altLang="ko-KR" dirty="0"/>
+              <a:t>(</a:t>
+            </a:r>
+            <a:r>
+              <a:rPr lang="ko-KR" altLang="en-US" dirty="0"/>
+              <a:t>디자인</a:t>
+            </a:r>
+            <a:r>
+              <a:rPr lang="en-US" altLang="ko-KR" dirty="0"/>
+              <a:t>)</a:t>
+            </a:r>
+            <a:endParaRPr dirty="0"/>
+          </a:p>
+        </p:txBody>
+      </p:sp>
+      <p:sp>
+        <p:nvSpPr>
+          <p:cNvPr id="43" name="Google Shape;43;p2"/>
+          <p:cNvSpPr txBox="1">
+            <a:spLocks noGrp="1"/>
+          </p:cNvSpPr>
+          <p:nvPr>
+            <p:ph type="body" idx="3"/>
+          </p:nvPr>
+        </p:nvSpPr>
+        <p:spPr>
+          <a:xfrm>
+            <a:off x="3459067" y="1521485"/>
+            <a:ext cx="2859115" cy="312057"/>
+          </a:xfrm>
+          <a:prstGeom prst="rect">
+            <a:avLst/>
+          </a:prstGeom>
+          <a:noFill/>
+          <a:ln>
+            <a:noFill/>
+          </a:ln>
+        </p:spPr>
+        <p:txBody>
+          <a:bodyPr spcFirstLastPara="1" wrap="square" lIns="91425" tIns="45700" rIns="91425" bIns="45700" anchor="t" anchorCtr="0">
+            <a:noAutofit/>
+          </a:bodyPr>
+          <a:lstStyle/>
+          <a:p>
+            <a:pPr marL="171450" lvl="0" indent="-171450" algn="l" rtl="0">
+              <a:lnSpc>
+                <a:spcPct val="100000"/>
+              </a:lnSpc>
+              <a:spcBef>
+                <a:spcPts val="0"/>
+              </a:spcBef>
+              <a:spcAft>
+                <a:spcPts val="0"/>
+              </a:spcAft>
+              <a:buClr>
+                <a:srgbClr val="2AB9C7"/>
+              </a:buClr>
+              <a:buSzPts val="1100"/>
+              <a:buFont typeface="Calibri"/>
+              <a:buChar char="•"/>
+            </a:pPr>
+            <a:r>
+              <a:rPr lang="ko-KR" altLang="en-US" dirty="0"/>
+              <a:t>프로토 코딩 결과</a:t>
+            </a:r>
+            <a:r>
+              <a:rPr lang="en-US" altLang="ko-KR" dirty="0"/>
+              <a:t>(</a:t>
+            </a:r>
+            <a:r>
+              <a:rPr lang="ko-KR" altLang="en-US" dirty="0"/>
+              <a:t>캡쳐</a:t>
+            </a:r>
+            <a:r>
+              <a:rPr lang="en-US" altLang="ko-KR" dirty="0"/>
+              <a:t>)</a:t>
+            </a:r>
+            <a:endParaRPr dirty="0"/>
+          </a:p>
+        </p:txBody>
+      </p:sp>
+      <p:cxnSp>
+        <p:nvCxnSpPr>
+          <p:cNvPr id="44" name="Google Shape;44;p2"/>
+          <p:cNvCxnSpPr/>
+          <p:nvPr/>
+        </p:nvCxnSpPr>
+        <p:spPr>
+          <a:xfrm>
+            <a:off x="3417707" y="1734796"/>
+            <a:ext cx="0" cy="7809253"/>
+          </a:xfrm>
+          <a:prstGeom prst="straightConnector1">
+            <a:avLst/>
+          </a:prstGeom>
+          <a:noFill/>
+          <a:ln w="9525" cap="flat" cmpd="sng">
+            <a:solidFill>
+              <a:schemeClr val="dk1"/>
+            </a:solidFill>
+            <a:prstDash val="solid"/>
+            <a:miter lim="800000"/>
+            <a:headEnd type="none" w="sm" len="sm"/>
+            <a:tailEnd type="none" w="sm" len="sm"/>
+          </a:ln>
+        </p:spPr>
+      </p:cxnSp>
+      <p:pic>
+        <p:nvPicPr>
+          <p:cNvPr id="9" name="그림 8">
+            <a:extLst>
+              <a:ext uri="{FF2B5EF4-FFF2-40B4-BE49-F238E27FC236}">
+                <a16:creationId xmlns:a16="http://schemas.microsoft.com/office/drawing/2014/main" id="{D2516DDC-7B72-6449-B0AB-D1997A3B323F}"/>
+              </a:ext>
+            </a:extLst>
+          </p:cNvPr>
+          <p:cNvPicPr>
+            <a:picLocks noChangeAspect="1"/>
+          </p:cNvPicPr>
+          <p:nvPr/>
+        </p:nvPicPr>
+        <p:blipFill>
+          <a:blip r:embed="rId3"/>
+          <a:stretch>
+            <a:fillRect/>
+          </a:stretch>
+        </p:blipFill>
+        <p:spPr>
+          <a:xfrm>
+            <a:off x="298609" y="1776014"/>
+            <a:ext cx="2988916" cy="7726816"/>
+          </a:xfrm>
+          <a:prstGeom prst="rect">
+            <a:avLst/>
+          </a:prstGeom>
+        </p:spPr>
+      </p:pic>
+      <p:pic>
+        <p:nvPicPr>
+          <p:cNvPr id="7" name="그림 6">
+            <a:extLst>
+              <a:ext uri="{FF2B5EF4-FFF2-40B4-BE49-F238E27FC236}">
+                <a16:creationId xmlns:a16="http://schemas.microsoft.com/office/drawing/2014/main" id="{6DAF9D98-69E0-804C-8A4B-7D5E496A6C7B}"/>
+              </a:ext>
+            </a:extLst>
+          </p:cNvPr>
+          <p:cNvPicPr>
+            <a:picLocks noChangeAspect="1"/>
+          </p:cNvPicPr>
+          <p:nvPr/>
+        </p:nvPicPr>
+        <p:blipFill>
+          <a:blip r:embed="rId4"/>
+          <a:stretch>
+            <a:fillRect/>
+          </a:stretch>
+        </p:blipFill>
+        <p:spPr>
+          <a:xfrm>
+            <a:off x="3471032" y="1784399"/>
+            <a:ext cx="3172835" cy="7706856"/>
+          </a:xfrm>
+          <a:prstGeom prst="rect">
+            <a:avLst/>
+          </a:prstGeom>
+        </p:spPr>
+      </p:pic>
+    </p:spTree>
+    <p:extLst>
+      <p:ext uri="{BB962C8B-B14F-4D97-AF65-F5344CB8AC3E}">
+        <p14:creationId xmlns:p14="http://schemas.microsoft.com/office/powerpoint/2010/main" val="825132326"/>
+      </p:ext>
+    </p:extLst>
+  </p:cSld>
+  <p:clrMapOvr>
+    <a:masterClrMapping/>
+  </p:clrMapOvr>
+</p:sld>
+</file>
+
+<file path=ppt/slides/slide4.xml><?xml version="1.0" encoding="utf-8"?>
+<p:sld xmlns:a="http://schemas.openxmlformats.org/drawingml/2006/main" xmlns:r="http://schemas.openxmlformats.org/officeDocument/2006/relationships" xmlns:p="http://schemas.openxmlformats.org/presentationml/2006/main">
+  <p:cSld>
+    <p:spTree>
+      <p:nvGrpSpPr>
         <p:cNvPr id="1" name="Shape 48"/>
         <p:cNvGrpSpPr/>
         <p:nvPr/>
@@ -7586,10 +8094,10 @@
       </p:sp>
       <p:pic>
         <p:nvPicPr>
-          <p:cNvPr id="3" name="그림 2" descr="텍스트이(가) 표시된 사진&#10;&#10;자동 생성된 설명">
+          <p:cNvPr id="7" name="그림 6" descr="텍스트이(가) 표시된 사진&#10;&#10;자동 생성된 설명">
             <a:extLst>
               <a:ext uri="{FF2B5EF4-FFF2-40B4-BE49-F238E27FC236}">
-                <a16:creationId xmlns:a16="http://schemas.microsoft.com/office/drawing/2014/main" id="{94D27F92-4802-9B44-8771-493511C0C394}"/>
+                <a16:creationId xmlns:a16="http://schemas.microsoft.com/office/drawing/2014/main" id="{2B4B12F2-9DDF-734A-8997-03C22F43ED05}"/>
               </a:ext>
             </a:extLst>
           </p:cNvPr>
@@ -7606,8 +8114,8 @@
         </p:blipFill>
         <p:spPr>
           <a:xfrm>
-            <a:off x="193822" y="1984344"/>
-            <a:ext cx="6470355" cy="2863033"/>
+            <a:off x="236356" y="1876604"/>
+            <a:ext cx="6363481" cy="3076385"/>
           </a:xfrm>
           <a:prstGeom prst="rect">
             <a:avLst/>
@@ -7616,10 +8124,10 @@
       </p:pic>
       <p:pic>
         <p:nvPicPr>
-          <p:cNvPr id="5" name="그림 4" descr="텍스트이(가) 표시된 사진&#10;&#10;자동 생성된 설명">
+          <p:cNvPr id="9" name="그림 8" descr="텍스트이(가) 표시된 사진&#10;&#10;자동 생성된 설명">
             <a:extLst>
               <a:ext uri="{FF2B5EF4-FFF2-40B4-BE49-F238E27FC236}">
-                <a16:creationId xmlns:a16="http://schemas.microsoft.com/office/drawing/2014/main" id="{92FD1884-8D7E-4D41-AD6B-90BD23D0FE9E}"/>
+                <a16:creationId xmlns:a16="http://schemas.microsoft.com/office/drawing/2014/main" id="{E9C7C598-4330-1E49-8092-8B78ADAC44CF}"/>
               </a:ext>
             </a:extLst>
           </p:cNvPr>
@@ -7636,8 +8144,8 @@
         </p:blipFill>
         <p:spPr>
           <a:xfrm>
-            <a:off x="322673" y="5863987"/>
-            <a:ext cx="6351298" cy="3600044"/>
+            <a:off x="286640" y="5864253"/>
+            <a:ext cx="6260263" cy="3552024"/>
           </a:xfrm>
           <a:prstGeom prst="rect">
             <a:avLst/>

</xml_diff>